<commit_message>
flume conf updated based on feedback from @seanorama & added missing libs
</commit_message>
<xml_diff>
--- a/presentation/Falcon PoC - DataPipeline.pptx
+++ b/presentation/Falcon PoC - DataPipeline.pptx
@@ -216,7 +216,7 @@
           <a:p>
             <a:fld id="{2CA712E4-16E2-3546-BEE8-BF686527E0AB}" type="datetimeFigureOut">
               <a:rPr lang="en-US" smtClean="0"/>
-              <a:t>9/6/15</a:t>
+              <a:t>9/8/15</a:t>
             </a:fld>
             <a:endParaRPr lang="en-US"/>
           </a:p>
@@ -382,7 +382,7 @@
           <a:p>
             <a:fld id="{98FAAD08-77AB-C840-8F52-1CD9AC3D73F9}" type="datetimeFigureOut">
               <a:rPr lang="en-US" smtClean="0"/>
-              <a:t>9/6/15</a:t>
+              <a:t>9/8/15</a:t>
             </a:fld>
             <a:endParaRPr lang="en-US"/>
           </a:p>
@@ -2443,7 +2443,7 @@
           <a:p>
             <a:fld id="{0E2E9980-219D-FE4F-8410-12F447CD7B6A}" type="datetimeFigureOut">
               <a:rPr lang="en-US" smtClean="0"/>
-              <a:t>9/6/15</a:t>
+              <a:t>9/8/15</a:t>
             </a:fld>
             <a:endParaRPr lang="en-US"/>
           </a:p>
@@ -5675,11 +5675,7 @@
           <a:p>
             <a:r>
               <a:rPr lang="en-US" dirty="0" smtClean="0"/>
-              <a:t>Data </a:t>
-            </a:r>
-            <a:r>
-              <a:rPr lang="en-US" dirty="0" smtClean="0"/>
-              <a:t>Pipeline Demo</a:t>
+              <a:t>Data Pipeline Demo</a:t>
             </a:r>
             <a:endParaRPr lang="en-US" dirty="0"/>
           </a:p>
@@ -23687,25 +23683,6 @@
       </p:sp>
       <p:sp>
         <p:nvSpPr>
-          <p:cNvPr id="3" name="Text Placeholder 2"/>
-          <p:cNvSpPr>
-            <a:spLocks noGrp="1"/>
-          </p:cNvSpPr>
-          <p:nvPr>
-            <p:ph type="body" sz="quarter" idx="10"/>
-          </p:nvPr>
-        </p:nvSpPr>
-        <p:spPr/>
-        <p:txBody>
-          <a:bodyPr/>
-          <a:lstStyle/>
-          <a:p>
-            <a:endParaRPr lang="en-US" dirty="0"/>
-          </a:p>
-        </p:txBody>
-      </p:sp>
-      <p:sp>
-        <p:nvSpPr>
           <p:cNvPr id="4" name="Subtitle 3"/>
           <p:cNvSpPr>
             <a:spLocks noGrp="1"/>
@@ -23797,25 +23774,6 @@
       </p:sp>
       <p:sp>
         <p:nvSpPr>
-          <p:cNvPr id="3" name="Text Placeholder 2"/>
-          <p:cNvSpPr>
-            <a:spLocks noGrp="1"/>
-          </p:cNvSpPr>
-          <p:nvPr>
-            <p:ph type="body" sz="quarter" idx="10"/>
-          </p:nvPr>
-        </p:nvSpPr>
-        <p:spPr/>
-        <p:txBody>
-          <a:bodyPr/>
-          <a:lstStyle/>
-          <a:p>
-            <a:endParaRPr lang="en-US"/>
-          </a:p>
-        </p:txBody>
-      </p:sp>
-      <p:sp>
-        <p:nvSpPr>
           <p:cNvPr id="4" name="Subtitle 3"/>
           <p:cNvSpPr>
             <a:spLocks noGrp="1"/>
@@ -24704,7 +24662,7 @@
           <a:p>
             <a:r>
               <a:rPr lang="en-US" dirty="0" smtClean="0"/>
-              <a:t>Lets do Hadoop </a:t>
+              <a:t>We do Hadoop </a:t>
             </a:r>
             <a:endParaRPr lang="en-US" dirty="0"/>
           </a:p>

</xml_diff>